<commit_message>
deuxieme essai python pptx
</commit_message>
<xml_diff>
--- a/presentation/pres_etude_marche.pptx
+++ b/presentation/pres_etude_marche.pptx
@@ -6,6 +6,8 @@
   </p:sldMasterIdLst>
   <p:sldIdLst>
     <p:sldId id="256" r:id="rId7"/>
+    <p:sldId id="257" r:id="rId8"/>
+    <p:sldId id="258" r:id="rId9"/>
   </p:sldIdLst>
   <p:sldSz cx="9144000" cy="6858000" type="screen4x3"/>
   <p:notesSz cx="6858000" cy="9144000"/>
@@ -3095,7 +3097,7 @@
             <a:spLocks noGrp="1"/>
           </p:cNvSpPr>
           <p:nvPr>
-            <p:ph type="ctrTitle"/>
+            <p:ph type="title"/>
           </p:nvPr>
         </p:nvSpPr>
         <p:spPr/>
@@ -3111,12 +3113,12 @@
       </p:sp>
       <p:sp>
         <p:nvSpPr>
-          <p:cNvPr id="3" name="Subtitle 2"/>
-          <p:cNvSpPr>
-            <a:spLocks noGrp="1"/>
-          </p:cNvSpPr>
-          <p:nvPr>
-            <p:ph type="subTitle" idx="1"/>
+          <p:cNvPr id="3" name="Text Placeholder 2"/>
+          <p:cNvSpPr>
+            <a:spLocks noGrp="1"/>
+          </p:cNvSpPr>
+          <p:nvPr>
+            <p:ph type="body" idx="1"/>
           </p:nvPr>
         </p:nvSpPr>
         <p:spPr/>
@@ -3128,6 +3130,170 @@
               <a:t>Etude de marché</a:t>
             </a:r>
           </a:p>
+        </p:txBody>
+      </p:sp>
+      <p:pic>
+        <p:nvPicPr>
+          <p:cNvPr id="4" name="Picture 3" descr="image_poule.jpeg"/>
+          <p:cNvPicPr>
+            <a:picLocks noChangeAspect="1"/>
+          </p:cNvPicPr>
+          <p:nvPr/>
+        </p:nvPicPr>
+        <p:blipFill>
+          <a:blip r:embed="rId2"/>
+          <a:stretch>
+            <a:fillRect/>
+          </a:stretch>
+        </p:blipFill>
+        <p:spPr>
+          <a:xfrm>
+            <a:off x="1" y="1"/>
+            <a:ext cx="15240000" cy="7962900"/>
+          </a:xfrm>
+          <a:prstGeom prst="rect">
+            <a:avLst/>
+          </a:prstGeom>
+        </p:spPr>
+      </p:pic>
+    </p:spTree>
+  </p:cSld>
+  <p:clrMapOvr>
+    <a:masterClrMapping/>
+  </p:clrMapOvr>
+</p:sld>
+</file>
+
+<file path=ppt/slides/slide2.xml><?xml version="1.0" encoding="utf-8"?>
+<p:sld xmlns:a="http://schemas.openxmlformats.org/drawingml/2006/main" xmlns:p="http://schemas.openxmlformats.org/presentationml/2006/main" xmlns:r="http://schemas.openxmlformats.org/officeDocument/2006/relationships">
+  <p:cSld>
+    <p:spTree>
+      <p:nvGrpSpPr>
+        <p:cNvPr id="1" name=""/>
+        <p:cNvGrpSpPr/>
+        <p:nvPr/>
+      </p:nvGrpSpPr>
+      <p:grpSpPr/>
+      <p:sp>
+        <p:nvSpPr>
+          <p:cNvPr id="2" name="Title 1"/>
+          <p:cNvSpPr>
+            <a:spLocks noGrp="1"/>
+          </p:cNvSpPr>
+          <p:nvPr>
+            <p:ph type="title"/>
+          </p:nvPr>
+        </p:nvSpPr>
+        <p:spPr/>
+        <p:txBody>
+          <a:bodyPr/>
+          <a:lstStyle/>
+          <a:p/>
+        </p:txBody>
+      </p:sp>
+      <p:pic>
+        <p:nvPicPr>
+          <p:cNvPr id="3" name="Picture Placeholder 2" descr="image_poule.jpeg"/>
+          <p:cNvPicPr>
+            <a:picLocks noGrp="1" noChangeAspect="1"/>
+          </p:cNvPicPr>
+          <p:nvPr>
+            <p:ph type="pic" idx="1"/>
+          </p:nvPr>
+        </p:nvPicPr>
+        <p:blipFill>
+          <a:blip r:embed="rId2"/>
+          <a:srcRect l="15167" r="15167"/>
+          <a:stretch>
+            <a:fillRect/>
+          </a:stretch>
+        </p:blipFill>
+        <p:spPr/>
+      </p:pic>
+      <p:sp>
+        <p:nvSpPr>
+          <p:cNvPr id="4" name="Text Placeholder 3"/>
+          <p:cNvSpPr>
+            <a:spLocks noGrp="1"/>
+          </p:cNvSpPr>
+          <p:nvPr>
+            <p:ph type="body" idx="2" sz="half"/>
+          </p:nvPr>
+        </p:nvSpPr>
+        <p:spPr/>
+        <p:txBody>
+          <a:bodyPr/>
+          <a:lstStyle/>
+          <a:p/>
+        </p:txBody>
+      </p:sp>
+    </p:spTree>
+  </p:cSld>
+  <p:clrMapOvr>
+    <a:masterClrMapping/>
+  </p:clrMapOvr>
+</p:sld>
+</file>
+
+<file path=ppt/slides/slide3.xml><?xml version="1.0" encoding="utf-8"?>
+<p:sld xmlns:a="http://schemas.openxmlformats.org/drawingml/2006/main" xmlns:p="http://schemas.openxmlformats.org/presentationml/2006/main" xmlns:r="http://schemas.openxmlformats.org/officeDocument/2006/relationships">
+  <p:cSld>
+    <p:spTree>
+      <p:nvGrpSpPr>
+        <p:cNvPr id="1" name=""/>
+        <p:cNvGrpSpPr/>
+        <p:nvPr/>
+      </p:nvGrpSpPr>
+      <p:grpSpPr/>
+      <p:sp>
+        <p:nvSpPr>
+          <p:cNvPr id="2" name="Title 1"/>
+          <p:cNvSpPr>
+            <a:spLocks noGrp="1"/>
+          </p:cNvSpPr>
+          <p:nvPr>
+            <p:ph type="title"/>
+          </p:nvPr>
+        </p:nvSpPr>
+        <p:spPr/>
+        <p:txBody>
+          <a:bodyPr/>
+          <a:lstStyle/>
+          <a:p/>
+        </p:txBody>
+      </p:sp>
+      <p:sp>
+        <p:nvSpPr>
+          <p:cNvPr id="3" name="Content Placeholder 2"/>
+          <p:cNvSpPr>
+            <a:spLocks noGrp="1"/>
+          </p:cNvSpPr>
+          <p:nvPr>
+            <p:ph idx="1"/>
+          </p:nvPr>
+        </p:nvSpPr>
+        <p:spPr/>
+        <p:txBody>
+          <a:bodyPr/>
+          <a:lstStyle/>
+          <a:p/>
+        </p:txBody>
+      </p:sp>
+      <p:sp>
+        <p:nvSpPr>
+          <p:cNvPr id="4" name="Text Placeholder 3"/>
+          <p:cNvSpPr>
+            <a:spLocks noGrp="1"/>
+          </p:cNvSpPr>
+          <p:nvPr>
+            <p:ph type="body" idx="2" sz="half"/>
+          </p:nvPr>
+        </p:nvSpPr>
+        <p:spPr/>
+        <p:txBody>
+          <a:bodyPr/>
+          <a:lstStyle/>
+          <a:p/>
         </p:txBody>
       </p:sp>
     </p:spTree>

</xml_diff>